<commit_message>
doc + compil g++
</commit_message>
<xml_diff>
--- a/pilot.pptx
+++ b/pilot.pptx
@@ -242,7 +242,7 @@
           <a:p>
             <a:fld id="{B2A250FE-313D-4EFF-A7E9-28D92504F979}" type="datetimeFigureOut">
               <a:rPr lang="fr-FR" smtClean="0"/>
-              <a:t>21/10/2015</a:t>
+              <a:t>22/10/2015</a:t>
             </a:fld>
             <a:endParaRPr lang="fr-FR"/>
           </a:p>
@@ -412,7 +412,7 @@
           <a:p>
             <a:fld id="{B2A250FE-313D-4EFF-A7E9-28D92504F979}" type="datetimeFigureOut">
               <a:rPr lang="fr-FR" smtClean="0"/>
-              <a:t>21/10/2015</a:t>
+              <a:t>22/10/2015</a:t>
             </a:fld>
             <a:endParaRPr lang="fr-FR"/>
           </a:p>
@@ -592,7 +592,7 @@
           <a:p>
             <a:fld id="{B2A250FE-313D-4EFF-A7E9-28D92504F979}" type="datetimeFigureOut">
               <a:rPr lang="fr-FR" smtClean="0"/>
-              <a:t>21/10/2015</a:t>
+              <a:t>22/10/2015</a:t>
             </a:fld>
             <a:endParaRPr lang="fr-FR"/>
           </a:p>
@@ -762,7 +762,7 @@
           <a:p>
             <a:fld id="{B2A250FE-313D-4EFF-A7E9-28D92504F979}" type="datetimeFigureOut">
               <a:rPr lang="fr-FR" smtClean="0"/>
-              <a:t>21/10/2015</a:t>
+              <a:t>22/10/2015</a:t>
             </a:fld>
             <a:endParaRPr lang="fr-FR"/>
           </a:p>
@@ -1008,7 +1008,7 @@
           <a:p>
             <a:fld id="{B2A250FE-313D-4EFF-A7E9-28D92504F979}" type="datetimeFigureOut">
               <a:rPr lang="fr-FR" smtClean="0"/>
-              <a:t>21/10/2015</a:t>
+              <a:t>22/10/2015</a:t>
             </a:fld>
             <a:endParaRPr lang="fr-FR"/>
           </a:p>
@@ -1240,7 +1240,7 @@
           <a:p>
             <a:fld id="{B2A250FE-313D-4EFF-A7E9-28D92504F979}" type="datetimeFigureOut">
               <a:rPr lang="fr-FR" smtClean="0"/>
-              <a:t>21/10/2015</a:t>
+              <a:t>22/10/2015</a:t>
             </a:fld>
             <a:endParaRPr lang="fr-FR"/>
           </a:p>
@@ -1607,7 +1607,7 @@
           <a:p>
             <a:fld id="{B2A250FE-313D-4EFF-A7E9-28D92504F979}" type="datetimeFigureOut">
               <a:rPr lang="fr-FR" smtClean="0"/>
-              <a:t>21/10/2015</a:t>
+              <a:t>22/10/2015</a:t>
             </a:fld>
             <a:endParaRPr lang="fr-FR"/>
           </a:p>
@@ -1725,7 +1725,7 @@
           <a:p>
             <a:fld id="{B2A250FE-313D-4EFF-A7E9-28D92504F979}" type="datetimeFigureOut">
               <a:rPr lang="fr-FR" smtClean="0"/>
-              <a:t>21/10/2015</a:t>
+              <a:t>22/10/2015</a:t>
             </a:fld>
             <a:endParaRPr lang="fr-FR"/>
           </a:p>
@@ -1820,7 +1820,7 @@
           <a:p>
             <a:fld id="{B2A250FE-313D-4EFF-A7E9-28D92504F979}" type="datetimeFigureOut">
               <a:rPr lang="fr-FR" smtClean="0"/>
-              <a:t>21/10/2015</a:t>
+              <a:t>22/10/2015</a:t>
             </a:fld>
             <a:endParaRPr lang="fr-FR"/>
           </a:p>
@@ -2097,7 +2097,7 @@
           <a:p>
             <a:fld id="{B2A250FE-313D-4EFF-A7E9-28D92504F979}" type="datetimeFigureOut">
               <a:rPr lang="fr-FR" smtClean="0"/>
-              <a:t>21/10/2015</a:t>
+              <a:t>22/10/2015</a:t>
             </a:fld>
             <a:endParaRPr lang="fr-FR"/>
           </a:p>
@@ -2350,7 +2350,7 @@
           <a:p>
             <a:fld id="{B2A250FE-313D-4EFF-A7E9-28D92504F979}" type="datetimeFigureOut">
               <a:rPr lang="fr-FR" smtClean="0"/>
-              <a:t>21/10/2015</a:t>
+              <a:t>22/10/2015</a:t>
             </a:fld>
             <a:endParaRPr lang="fr-FR"/>
           </a:p>
@@ -2563,7 +2563,7 @@
           <a:p>
             <a:fld id="{B2A250FE-313D-4EFF-A7E9-28D92504F979}" type="datetimeFigureOut">
               <a:rPr lang="fr-FR" smtClean="0"/>
-              <a:t>21/10/2015</a:t>
+              <a:t>22/10/2015</a:t>
             </a:fld>
             <a:endParaRPr lang="fr-FR"/>
           </a:p>
@@ -3145,7 +3145,7 @@
         <p:spPr>
           <a:xfrm>
             <a:off x="2497503" y="2049447"/>
-            <a:ext cx="620554" cy="369332"/>
+            <a:ext cx="788870" cy="369332"/>
           </a:xfrm>
           <a:prstGeom prst="rect">
             <a:avLst/>
@@ -3160,7 +3160,7 @@
           <a:p>
             <a:r>
               <a:rPr lang="fr-FR" dirty="0" smtClean="0"/>
-              <a:t>Data</a:t>
+              <a:t>Data *</a:t>
             </a:r>
             <a:endParaRPr lang="fr-FR" dirty="0"/>
           </a:p>
@@ -3175,7 +3175,7 @@
         <p:spPr>
           <a:xfrm>
             <a:off x="2486379" y="2369532"/>
-            <a:ext cx="1757661" cy="369332"/>
+            <a:ext cx="1837811" cy="369332"/>
           </a:xfrm>
           <a:prstGeom prst="rect">
             <a:avLst/>
@@ -3190,15 +3190,15 @@
           <a:p>
             <a:r>
               <a:rPr lang="fr-FR" dirty="0" smtClean="0"/>
-              <a:t>Command (</a:t>
+              <a:t>Command </a:t>
+            </a:r>
+            <a:r>
+              <a:rPr lang="fr-FR" dirty="0" smtClean="0"/>
+              <a:t> * </a:t>
             </a:r>
             <a:r>
               <a:rPr lang="fr-FR" dirty="0" err="1" smtClean="0"/>
               <a:t>next</a:t>
-            </a:r>
-            <a:r>
-              <a:rPr lang="fr-FR" dirty="0" smtClean="0"/>
-              <a:t>)</a:t>
             </a:r>
             <a:endParaRPr lang="fr-FR" dirty="0"/>
           </a:p>
@@ -3213,7 +3213,7 @@
         <p:spPr>
           <a:xfrm>
             <a:off x="2500601" y="2967128"/>
-            <a:ext cx="915059" cy="369332"/>
+            <a:ext cx="1056123" cy="369332"/>
           </a:xfrm>
           <a:prstGeom prst="rect">
             <a:avLst/>
@@ -3229,6 +3229,10 @@
             <a:r>
               <a:rPr lang="fr-FR" dirty="0" err="1" smtClean="0"/>
               <a:t>Execute</a:t>
+            </a:r>
+            <a:r>
+              <a:rPr lang="fr-FR" dirty="0" smtClean="0"/>
+              <a:t>()</a:t>
             </a:r>
             <a:endParaRPr lang="fr-FR" dirty="0"/>
           </a:p>
@@ -3364,8 +3368,8 @@
         </p:nvSpPr>
         <p:spPr>
           <a:xfrm>
-            <a:off x="2466972" y="5197155"/>
-            <a:ext cx="1300356" cy="369332"/>
+            <a:off x="2458007" y="5197155"/>
+            <a:ext cx="2757101" cy="369332"/>
           </a:xfrm>
           <a:prstGeom prst="rect">
             <a:avLst/>
@@ -3381,6 +3385,18 @@
             <a:r>
               <a:rPr lang="fr-FR" dirty="0" err="1" smtClean="0"/>
               <a:t>AddDepend</a:t>
+            </a:r>
+            <a:r>
+              <a:rPr lang="fr-FR" dirty="0" smtClean="0"/>
+              <a:t>(</a:t>
+            </a:r>
+            <a:r>
+              <a:rPr lang="fr-FR" dirty="0" err="1" smtClean="0"/>
+              <a:t>MediatorType</a:t>
+            </a:r>
+            <a:r>
+              <a:rPr lang="fr-FR" dirty="0" smtClean="0"/>
+              <a:t>)</a:t>
             </a:r>
             <a:endParaRPr lang="fr-FR" dirty="0"/>
           </a:p>
@@ -3710,8 +3726,8 @@
         </p:nvSpPr>
         <p:spPr>
           <a:xfrm>
-            <a:off x="6279505" y="2066620"/>
-            <a:ext cx="3090974" cy="369332"/>
+            <a:off x="6198820" y="2066620"/>
+            <a:ext cx="3206391" cy="369332"/>
           </a:xfrm>
           <a:prstGeom prst="rect">
             <a:avLst/>
@@ -3738,7 +3754,7 @@
             </a:r>
             <a:r>
               <a:rPr lang="fr-FR" dirty="0" smtClean="0"/>
-              <a:t>&gt;</a:t>
+              <a:t>*&gt;</a:t>
             </a:r>
             <a:endParaRPr lang="fr-FR" dirty="0"/>
           </a:p>
@@ -4439,9 +4455,6 @@
               </a:rPr>
               <a:t>(){…}</a:t>
             </a:r>
-            <a:endParaRPr lang="fr-FR" dirty="0" smtClean="0">
-              <a:latin typeface="Consolas" panose="020B0609020204030204" pitchFamily="49" charset="0"/>
-            </a:endParaRPr>
           </a:p>
         </p:txBody>
       </p:sp>
@@ -4813,9 +4826,6 @@
               </a:rPr>
               <a:t>));</a:t>
             </a:r>
-            <a:endParaRPr lang="en-US" dirty="0" smtClean="0">
-              <a:latin typeface="Consolas" panose="020B0609020204030204" pitchFamily="49" charset="0"/>
-            </a:endParaRPr>
           </a:p>
         </p:txBody>
       </p:sp>
@@ -4888,9 +4898,6 @@
               </a:rPr>
               <a:t>();</a:t>
             </a:r>
-            <a:endParaRPr lang="fr-FR" dirty="0" smtClean="0">
-              <a:latin typeface="Consolas" panose="020B0609020204030204" pitchFamily="49" charset="0"/>
-            </a:endParaRPr>
           </a:p>
         </p:txBody>
       </p:sp>
@@ -4963,9 +4970,6 @@
               </a:rPr>
               <a:t> command)</a:t>
             </a:r>
-            <a:endParaRPr lang="en-US" dirty="0" smtClean="0">
-              <a:latin typeface="Consolas" panose="020B0609020204030204" pitchFamily="49" charset="0"/>
-            </a:endParaRPr>
           </a:p>
         </p:txBody>
       </p:sp>
@@ -5927,7 +5931,7 @@
   <a:extraClrSchemeLst/>
   <a:extLst>
     <a:ext uri="{05A4C25C-085E-4340-85A3-A5531E510DB2}">
-      <thm15:themeFamily xmlns:thm15="http://schemas.microsoft.com/office/thememl/2012/main" name="Office Theme" id="{62F939B6-93AF-4DB8-9C6B-D6C7DFDC589F}" vid="{4A3C46E8-61CC-4603-A589-7422A47A8E4A}"/>
+      <thm15:themeFamily xmlns:thm15="http://schemas.microsoft.com/office/thememl/2012/main" xmlns="" name="Office Theme" id="{62F939B6-93AF-4DB8-9C6B-D6C7DFDC589F}" vid="{4A3C46E8-61CC-4603-A589-7422A47A8E4A}"/>
     </a:ext>
   </a:extLst>
 </a:theme>

</xml_diff>